<commit_message>
Change of vocabulary (method vs. model) and update of diagrams
</commit_message>
<xml_diff>
--- a/Results/schema_060125.pptx
+++ b/Results/schema_060125.pptx
@@ -9861,7 +9861,7 @@
           <a:p>
             <a:fld id="{80FF1440-FB20-43AC-A885-455CF6238228}" type="datetimeFigureOut">
               <a:rPr lang="fr-FR" smtClean="0"/>
-              <a:t>13/01/2025</a:t>
+              <a:t>30/01/2025</a:t>
             </a:fld>
             <a:endParaRPr lang="fr-FR"/>
           </a:p>
@@ -10059,7 +10059,7 @@
           <a:p>
             <a:fld id="{80FF1440-FB20-43AC-A885-455CF6238228}" type="datetimeFigureOut">
               <a:rPr lang="fr-FR" smtClean="0"/>
-              <a:t>13/01/2025</a:t>
+              <a:t>30/01/2025</a:t>
             </a:fld>
             <a:endParaRPr lang="fr-FR"/>
           </a:p>
@@ -10267,7 +10267,7 @@
           <a:p>
             <a:fld id="{80FF1440-FB20-43AC-A885-455CF6238228}" type="datetimeFigureOut">
               <a:rPr lang="fr-FR" smtClean="0"/>
-              <a:t>13/01/2025</a:t>
+              <a:t>30/01/2025</a:t>
             </a:fld>
             <a:endParaRPr lang="fr-FR"/>
           </a:p>
@@ -10465,7 +10465,7 @@
           <a:p>
             <a:fld id="{80FF1440-FB20-43AC-A885-455CF6238228}" type="datetimeFigureOut">
               <a:rPr lang="fr-FR" smtClean="0"/>
-              <a:t>13/01/2025</a:t>
+              <a:t>30/01/2025</a:t>
             </a:fld>
             <a:endParaRPr lang="fr-FR"/>
           </a:p>
@@ -10740,7 +10740,7 @@
           <a:p>
             <a:fld id="{80FF1440-FB20-43AC-A885-455CF6238228}" type="datetimeFigureOut">
               <a:rPr lang="fr-FR" smtClean="0"/>
-              <a:t>13/01/2025</a:t>
+              <a:t>30/01/2025</a:t>
             </a:fld>
             <a:endParaRPr lang="fr-FR"/>
           </a:p>
@@ -11005,7 +11005,7 @@
           <a:p>
             <a:fld id="{80FF1440-FB20-43AC-A885-455CF6238228}" type="datetimeFigureOut">
               <a:rPr lang="fr-FR" smtClean="0"/>
-              <a:t>13/01/2025</a:t>
+              <a:t>30/01/2025</a:t>
             </a:fld>
             <a:endParaRPr lang="fr-FR"/>
           </a:p>
@@ -11417,7 +11417,7 @@
           <a:p>
             <a:fld id="{80FF1440-FB20-43AC-A885-455CF6238228}" type="datetimeFigureOut">
               <a:rPr lang="fr-FR" smtClean="0"/>
-              <a:t>13/01/2025</a:t>
+              <a:t>30/01/2025</a:t>
             </a:fld>
             <a:endParaRPr lang="fr-FR"/>
           </a:p>
@@ -11558,7 +11558,7 @@
           <a:p>
             <a:fld id="{80FF1440-FB20-43AC-A885-455CF6238228}" type="datetimeFigureOut">
               <a:rPr lang="fr-FR" smtClean="0"/>
-              <a:t>13/01/2025</a:t>
+              <a:t>30/01/2025</a:t>
             </a:fld>
             <a:endParaRPr lang="fr-FR"/>
           </a:p>
@@ -11671,7 +11671,7 @@
           <a:p>
             <a:fld id="{80FF1440-FB20-43AC-A885-455CF6238228}" type="datetimeFigureOut">
               <a:rPr lang="fr-FR" smtClean="0"/>
-              <a:t>13/01/2025</a:t>
+              <a:t>30/01/2025</a:t>
             </a:fld>
             <a:endParaRPr lang="fr-FR"/>
           </a:p>
@@ -11982,7 +11982,7 @@
           <a:p>
             <a:fld id="{80FF1440-FB20-43AC-A885-455CF6238228}" type="datetimeFigureOut">
               <a:rPr lang="fr-FR" smtClean="0"/>
-              <a:t>13/01/2025</a:t>
+              <a:t>30/01/2025</a:t>
             </a:fld>
             <a:endParaRPr lang="fr-FR"/>
           </a:p>
@@ -12270,7 +12270,7 @@
           <a:p>
             <a:fld id="{80FF1440-FB20-43AC-A885-455CF6238228}" type="datetimeFigureOut">
               <a:rPr lang="fr-FR" smtClean="0"/>
-              <a:t>13/01/2025</a:t>
+              <a:t>30/01/2025</a:t>
             </a:fld>
             <a:endParaRPr lang="fr-FR"/>
           </a:p>
@@ -12511,7 +12511,7 @@
           <a:p>
             <a:fld id="{80FF1440-FB20-43AC-A885-455CF6238228}" type="datetimeFigureOut">
               <a:rPr lang="fr-FR" smtClean="0"/>
-              <a:t>13/01/2025</a:t>
+              <a:t>30/01/2025</a:t>
             </a:fld>
             <a:endParaRPr lang="fr-FR"/>
           </a:p>
@@ -13634,7 +13634,7 @@
         </p:nvSpPr>
         <p:spPr>
           <a:xfrm rot="10035045">
-            <a:off x="3142524" y="3121577"/>
+            <a:off x="3226091" y="3424549"/>
             <a:ext cx="1241572" cy="511379"/>
           </a:xfrm>
           <a:prstGeom prst="rightArrow">
@@ -13775,7 +13775,7 @@
         </p:nvSpPr>
         <p:spPr>
           <a:xfrm>
-            <a:off x="7348527" y="1408008"/>
+            <a:off x="7678723" y="2552516"/>
             <a:ext cx="4513277" cy="523220"/>
           </a:xfrm>
           <a:prstGeom prst="rect">
@@ -13810,7 +13810,7 @@
         </p:nvSpPr>
         <p:spPr>
           <a:xfrm>
-            <a:off x="8055409" y="2020405"/>
+            <a:off x="7073664" y="740635"/>
             <a:ext cx="2623547" cy="318781"/>
           </a:xfrm>
           <a:prstGeom prst="roundRect">
@@ -13857,7 +13857,7 @@
         </p:nvSpPr>
         <p:spPr>
           <a:xfrm>
-            <a:off x="8151154" y="2027183"/>
+            <a:off x="7169409" y="747413"/>
             <a:ext cx="2446741" cy="307777"/>
           </a:xfrm>
           <a:prstGeom prst="rect">
@@ -13877,7 +13877,19 @@
             </a:r>
             <a:r>
               <a:rPr lang="en-US" sz="1400" dirty="0"/>
-              <a:t> Of Variance (A), </a:t>
+              <a:t> Of Variance </a:t>
+            </a:r>
+            <a:r>
+              <a:rPr lang="en-US" sz="1400" i="1" dirty="0">
+                <a:solidFill>
+                  <a:srgbClr val="0070C0"/>
+                </a:solidFill>
+              </a:rPr>
+              <a:t>(A)</a:t>
+            </a:r>
+            <a:r>
+              <a:rPr lang="en-US" sz="1400" dirty="0"/>
+              <a:t>, </a:t>
             </a:r>
             <a:r>
               <a:rPr lang="el-GR" sz="1400" dirty="0"/>
@@ -13885,9 +13897,21 @@
             </a:r>
             <a:r>
               <a:rPr lang="fr-FR" sz="1400" dirty="0"/>
-              <a:t>² (B)</a:t>
+              <a:t>² </a:t>
             </a:r>
-            <a:endParaRPr lang="en-US" sz="1400" dirty="0"/>
+            <a:r>
+              <a:rPr lang="fr-FR" sz="1400" dirty="0">
+                <a:solidFill>
+                  <a:srgbClr val="0070C0"/>
+                </a:solidFill>
+              </a:rPr>
+              <a:t>(B)</a:t>
+            </a:r>
+            <a:endParaRPr lang="en-US" sz="1400" dirty="0">
+              <a:solidFill>
+                <a:srgbClr val="0070C0"/>
+              </a:solidFill>
+            </a:endParaRPr>
           </a:p>
         </p:txBody>
       </p:sp>
@@ -13905,7 +13929,7 @@
         </p:nvSpPr>
         <p:spPr>
           <a:xfrm>
-            <a:off x="7678723" y="2658458"/>
+            <a:off x="7736162" y="3805013"/>
             <a:ext cx="4513277" cy="523220"/>
           </a:xfrm>
           <a:prstGeom prst="rect">
@@ -13940,7 +13964,7 @@
         </p:nvSpPr>
         <p:spPr>
           <a:xfrm>
-            <a:off x="7794074" y="3256171"/>
+            <a:off x="7851513" y="4402726"/>
             <a:ext cx="4000913" cy="318781"/>
           </a:xfrm>
           <a:prstGeom prst="roundRect">
@@ -13987,7 +14011,7 @@
         </p:nvSpPr>
         <p:spPr>
           <a:xfrm>
-            <a:off x="7839526" y="3270939"/>
+            <a:off x="7896965" y="4417494"/>
             <a:ext cx="3930228" cy="307777"/>
           </a:xfrm>
           <a:prstGeom prst="rect">
@@ -14003,7 +14027,27 @@
           <a:p>
             <a:r>
               <a:rPr lang="en-US" sz="1400" dirty="0"/>
-              <a:t>K-means (D), Group-Based Trajectory Modelling (G)</a:t>
+              <a:t>K-means </a:t>
+            </a:r>
+            <a:r>
+              <a:rPr lang="en-US" sz="1400" dirty="0">
+                <a:solidFill>
+                  <a:srgbClr val="7030A0"/>
+                </a:solidFill>
+              </a:rPr>
+              <a:t>(D)</a:t>
+            </a:r>
+            <a:r>
+              <a:rPr lang="en-US" sz="1400" dirty="0"/>
+              <a:t>, Group-Based Trajectory Modelling </a:t>
+            </a:r>
+            <a:r>
+              <a:rPr lang="en-US" sz="1400" dirty="0">
+                <a:solidFill>
+                  <a:srgbClr val="92D050"/>
+                </a:solidFill>
+              </a:rPr>
+              <a:t>(G)</a:t>
             </a:r>
           </a:p>
         </p:txBody>
@@ -14022,7 +14066,7 @@
         </p:nvSpPr>
         <p:spPr>
           <a:xfrm>
-            <a:off x="6812557" y="5190750"/>
+            <a:off x="7359511" y="1315763"/>
             <a:ext cx="4513277" cy="523220"/>
           </a:xfrm>
           <a:prstGeom prst="rect">
@@ -14057,7 +14101,7 @@
         </p:nvSpPr>
         <p:spPr>
           <a:xfrm>
-            <a:off x="7537621" y="5771257"/>
+            <a:off x="8084575" y="1896270"/>
             <a:ext cx="2623547" cy="318781"/>
           </a:xfrm>
           <a:prstGeom prst="roundRect">
@@ -14104,7 +14148,7 @@
         </p:nvSpPr>
         <p:spPr>
           <a:xfrm>
-            <a:off x="7860891" y="5769646"/>
+            <a:off x="8407845" y="1894659"/>
             <a:ext cx="2149275" cy="307777"/>
           </a:xfrm>
           <a:prstGeom prst="rect">
@@ -14120,7 +14164,15 @@
           <a:p>
             <a:r>
               <a:rPr lang="en-US" sz="1400" dirty="0"/>
-              <a:t>Latent Class Analysis (C)</a:t>
+              <a:t>Latent Class Analysis </a:t>
+            </a:r>
+            <a:r>
+              <a:rPr lang="en-US" sz="1400" dirty="0">
+                <a:solidFill>
+                  <a:srgbClr val="7030A0"/>
+                </a:solidFill>
+              </a:rPr>
+              <a:t>(C)</a:t>
             </a:r>
           </a:p>
         </p:txBody>
@@ -14139,7 +14191,7 @@
         </p:nvSpPr>
         <p:spPr>
           <a:xfrm>
-            <a:off x="2833390" y="5864317"/>
+            <a:off x="141083" y="128387"/>
             <a:ext cx="4762347" cy="523220"/>
           </a:xfrm>
           <a:prstGeom prst="rect">
@@ -14174,7 +14226,7 @@
         </p:nvSpPr>
         <p:spPr>
           <a:xfrm>
-            <a:off x="3899775" y="6440703"/>
+            <a:off x="1207468" y="704773"/>
             <a:ext cx="2623547" cy="318781"/>
           </a:xfrm>
           <a:prstGeom prst="roundRect">
@@ -14221,7 +14273,7 @@
         </p:nvSpPr>
         <p:spPr>
           <a:xfrm>
-            <a:off x="4491493" y="6439092"/>
+            <a:off x="1799186" y="703162"/>
             <a:ext cx="1542637" cy="307777"/>
           </a:xfrm>
           <a:prstGeom prst="rect">
@@ -14237,7 +14289,15 @@
           <a:p>
             <a:r>
               <a:rPr lang="en-US" sz="1400" dirty="0"/>
-              <a:t>Hidden Markov (L)</a:t>
+              <a:t>Hidden Markov </a:t>
+            </a:r>
+            <a:r>
+              <a:rPr lang="en-US" sz="1400" i="1" dirty="0">
+                <a:solidFill>
+                  <a:srgbClr val="92D050"/>
+                </a:solidFill>
+              </a:rPr>
+              <a:t>(L)</a:t>
             </a:r>
           </a:p>
         </p:txBody>
@@ -14256,8 +14316,8 @@
         </p:nvSpPr>
         <p:spPr>
           <a:xfrm>
-            <a:off x="-7076" y="3647072"/>
-            <a:ext cx="4646885" cy="738664"/>
+            <a:off x="129950" y="3249946"/>
+            <a:ext cx="3137829" cy="954107"/>
           </a:xfrm>
           <a:prstGeom prst="rect">
             <a:avLst/>
@@ -14291,7 +14351,7 @@
         </p:nvSpPr>
         <p:spPr>
           <a:xfrm>
-            <a:off x="639151" y="4416759"/>
+            <a:off x="465613" y="4345011"/>
             <a:ext cx="2623547" cy="318781"/>
           </a:xfrm>
           <a:prstGeom prst="roundRect">
@@ -14338,7 +14398,7 @@
         </p:nvSpPr>
         <p:spPr>
           <a:xfrm>
-            <a:off x="1396409" y="4415148"/>
+            <a:off x="1222871" y="4343400"/>
             <a:ext cx="1002642" cy="307777"/>
           </a:xfrm>
           <a:prstGeom prst="rect">
@@ -14354,7 +14414,15 @@
           <a:p>
             <a:r>
               <a:rPr lang="en-US" sz="1400" dirty="0"/>
-              <a:t>Mixed (F)</a:t>
+              <a:t>Mixed </a:t>
+            </a:r>
+            <a:r>
+              <a:rPr lang="en-US" sz="1400" i="1" dirty="0">
+                <a:solidFill>
+                  <a:srgbClr val="92D050"/>
+                </a:solidFill>
+              </a:rPr>
+              <a:t>(F)</a:t>
             </a:r>
           </a:p>
         </p:txBody>
@@ -14373,8 +14441,8 @@
         </p:nvSpPr>
         <p:spPr>
           <a:xfrm>
-            <a:off x="355833" y="281218"/>
-            <a:ext cx="4513277" cy="738664"/>
+            <a:off x="-37155" y="1360131"/>
+            <a:ext cx="3886003" cy="954107"/>
           </a:xfrm>
           <a:prstGeom prst="rect">
             <a:avLst/>
@@ -14408,8 +14476,8 @@
         </p:nvSpPr>
         <p:spPr>
           <a:xfrm>
-            <a:off x="1062715" y="1120253"/>
-            <a:ext cx="2623547" cy="318781"/>
+            <a:off x="556498" y="2410659"/>
+            <a:ext cx="2258916" cy="318781"/>
           </a:xfrm>
           <a:prstGeom prst="roundRect">
             <a:avLst/>
@@ -14455,8 +14523,8 @@
         </p:nvSpPr>
         <p:spPr>
           <a:xfrm>
-            <a:off x="2065494" y="1118642"/>
-            <a:ext cx="887681" cy="307777"/>
+            <a:off x="1201139" y="2424628"/>
+            <a:ext cx="1040404" cy="307777"/>
           </a:xfrm>
           <a:prstGeom prst="rect">
             <a:avLst/>
@@ -14471,7 +14539,15 @@
           <a:p>
             <a:r>
               <a:rPr lang="en-US" sz="1400" dirty="0"/>
-              <a:t>Joint (K)</a:t>
+              <a:t>Joint </a:t>
+            </a:r>
+            <a:r>
+              <a:rPr lang="en-US" sz="1400" i="1" dirty="0">
+                <a:solidFill>
+                  <a:srgbClr val="92D050"/>
+                </a:solidFill>
+              </a:rPr>
+              <a:t>(K)</a:t>
             </a:r>
           </a:p>
         </p:txBody>
@@ -14537,7 +14613,7 @@
         </p:nvSpPr>
         <p:spPr>
           <a:xfrm>
-            <a:off x="329628" y="2519522"/>
+            <a:off x="3855144" y="6344526"/>
             <a:ext cx="2623547" cy="498496"/>
           </a:xfrm>
           <a:prstGeom prst="roundRect">
@@ -14584,7 +14660,7 @@
         </p:nvSpPr>
         <p:spPr>
           <a:xfrm>
-            <a:off x="302871" y="2494797"/>
+            <a:off x="3820412" y="6357425"/>
             <a:ext cx="3092890" cy="523220"/>
           </a:xfrm>
           <a:prstGeom prst="rect">
@@ -14599,12 +14675,24 @@
           <a:lstStyle/>
           <a:p>
             <a:r>
-              <a:rPr lang="en-US" sz="1400" dirty="0" err="1"/>
+              <a:rPr lang="en-US" sz="1400" i="1" dirty="0" err="1"/>
               <a:t>AutoRegression</a:t>
             </a:r>
             <a:r>
+              <a:rPr lang="en-US" sz="1400" i="1" dirty="0"/>
+              <a:t> Integrated Moving Average </a:t>
+            </a:r>
+            <a:r>
               <a:rPr lang="en-US" sz="1400" dirty="0"/>
-              <a:t> Integrated Moving Average &amp; Cross-correlation (I)</a:t>
+              <a:t>&amp; Cross-correlation </a:t>
+            </a:r>
+            <a:r>
+              <a:rPr lang="en-US" sz="1400" dirty="0">
+                <a:solidFill>
+                  <a:srgbClr val="92D050"/>
+                </a:solidFill>
+              </a:rPr>
+              <a:t>(I)</a:t>
             </a:r>
           </a:p>
         </p:txBody>
@@ -14623,7 +14711,7 @@
         </p:nvSpPr>
         <p:spPr>
           <a:xfrm>
-            <a:off x="38706" y="1729163"/>
+            <a:off x="3531080" y="5591791"/>
             <a:ext cx="4513277" cy="738664"/>
           </a:xfrm>
           <a:prstGeom prst="rect">
@@ -14705,7 +14793,7 @@
         </p:nvSpPr>
         <p:spPr>
           <a:xfrm>
-            <a:off x="7646802" y="4196999"/>
+            <a:off x="6788590" y="5161215"/>
             <a:ext cx="4513277" cy="307777"/>
           </a:xfrm>
           <a:prstGeom prst="rect">
@@ -14740,7 +14828,7 @@
         </p:nvSpPr>
         <p:spPr>
           <a:xfrm>
-            <a:off x="8319609" y="4599454"/>
+            <a:off x="8215787" y="5486707"/>
             <a:ext cx="2623547" cy="318781"/>
           </a:xfrm>
           <a:prstGeom prst="roundRect">
@@ -14787,7 +14875,7 @@
         </p:nvSpPr>
         <p:spPr>
           <a:xfrm>
-            <a:off x="8567378" y="4606232"/>
+            <a:off x="8463556" y="5493485"/>
             <a:ext cx="2169490" cy="307777"/>
           </a:xfrm>
           <a:prstGeom prst="rect">
@@ -14803,7 +14891,15 @@
           <a:p>
             <a:r>
               <a:rPr lang="en-US" sz="1400" dirty="0"/>
-              <a:t>Dynamic Time Warping (J)</a:t>
+              <a:t>Dynamic Time Warping </a:t>
+            </a:r>
+            <a:r>
+              <a:rPr lang="en-US" sz="1400" dirty="0">
+                <a:solidFill>
+                  <a:srgbClr val="92D050"/>
+                </a:solidFill>
+              </a:rPr>
+              <a:t>(J)</a:t>
             </a:r>
           </a:p>
         </p:txBody>
@@ -14869,7 +14965,7 @@
         </p:nvSpPr>
         <p:spPr>
           <a:xfrm>
-            <a:off x="6009117" y="90933"/>
+            <a:off x="6130054" y="143885"/>
             <a:ext cx="4513277" cy="523220"/>
           </a:xfrm>
           <a:prstGeom prst="rect">
@@ -14904,7 +15000,7 @@
         </p:nvSpPr>
         <p:spPr>
           <a:xfrm>
-            <a:off x="6726976" y="627677"/>
+            <a:off x="8497173" y="3144512"/>
             <a:ext cx="2623547" cy="318781"/>
           </a:xfrm>
           <a:prstGeom prst="roundRect">
@@ -14951,7 +15047,7 @@
         </p:nvSpPr>
         <p:spPr>
           <a:xfrm>
-            <a:off x="6874077" y="626066"/>
+            <a:off x="8644274" y="3142901"/>
             <a:ext cx="2378980" cy="307777"/>
           </a:xfrm>
           <a:prstGeom prst="rect">
@@ -14967,7 +15063,15 @@
           <a:p>
             <a:r>
               <a:rPr lang="en-US" sz="1400" dirty="0"/>
-              <a:t>Latent Transition Analysis (H)</a:t>
+              <a:t>Latent Transition Analysis </a:t>
+            </a:r>
+            <a:r>
+              <a:rPr lang="en-US" sz="1400" i="1" dirty="0">
+                <a:solidFill>
+                  <a:srgbClr val="7030A0"/>
+                </a:solidFill>
+              </a:rPr>
+              <a:t>(H)</a:t>
             </a:r>
           </a:p>
         </p:txBody>
@@ -15033,7 +15137,7 @@
         </p:nvSpPr>
         <p:spPr>
           <a:xfrm>
-            <a:off x="-39144" y="5040347"/>
+            <a:off x="-52629" y="5113621"/>
             <a:ext cx="4762347" cy="523220"/>
           </a:xfrm>
           <a:prstGeom prst="rect">
@@ -15068,7 +15172,7 @@
         </p:nvSpPr>
         <p:spPr>
           <a:xfrm>
-            <a:off x="139116" y="5595563"/>
+            <a:off x="317702" y="5683397"/>
             <a:ext cx="2623547" cy="318781"/>
           </a:xfrm>
           <a:prstGeom prst="roundRect">
@@ -15115,7 +15219,7 @@
         </p:nvSpPr>
         <p:spPr>
           <a:xfrm>
-            <a:off x="257904" y="5600636"/>
+            <a:off x="436490" y="5688470"/>
             <a:ext cx="2378924" cy="307777"/>
           </a:xfrm>
           <a:prstGeom prst="rect">
@@ -15131,11 +15235,230 @@
           <a:p>
             <a:r>
               <a:rPr lang="en-US" sz="1400" dirty="0"/>
-              <a:t>Growth Mixture Modelling (E)</a:t>
+              <a:t>Growth Mixture Modelling </a:t>
+            </a:r>
+            <a:r>
+              <a:rPr lang="en-US" sz="1400" i="1" dirty="0">
+                <a:solidFill>
+                  <a:srgbClr val="92D050"/>
+                </a:solidFill>
+              </a:rPr>
+              <a:t>(E)</a:t>
             </a:r>
           </a:p>
         </p:txBody>
       </p:sp>
+      <p:sp>
+        <p:nvSpPr>
+          <p:cNvPr id="59" name="ZoneTexte 58">
+            <a:extLst>
+              <a:ext uri="{FF2B5EF4-FFF2-40B4-BE49-F238E27FC236}">
+                <a16:creationId xmlns:a16="http://schemas.microsoft.com/office/drawing/2014/main" id="{EEC11B9C-F950-45AA-9685-2407AA5446F8}"/>
+              </a:ext>
+            </a:extLst>
+          </p:cNvPr>
+          <p:cNvSpPr txBox="1"/>
+          <p:nvPr/>
+        </p:nvSpPr>
+        <p:spPr>
+          <a:xfrm>
+            <a:off x="10168569" y="6150114"/>
+            <a:ext cx="1904301" cy="707886"/>
+          </a:xfrm>
+          <a:prstGeom prst="rect">
+            <a:avLst/>
+          </a:prstGeom>
+          <a:noFill/>
+        </p:spPr>
+        <p:txBody>
+          <a:bodyPr wrap="square" rtlCol="0">
+            <a:spAutoFit/>
+          </a:bodyPr>
+          <a:lstStyle/>
+          <a:p>
+            <a:r>
+              <a:rPr lang="fr-FR" sz="1000" dirty="0" err="1"/>
+              <a:t>Comparison</a:t>
+            </a:r>
+            <a:r>
+              <a:rPr lang="fr-FR" sz="1000" dirty="0"/>
+              <a:t> </a:t>
+            </a:r>
+            <a:r>
+              <a:rPr lang="fr-FR" sz="1000" dirty="0" err="1"/>
+              <a:t>method</a:t>
+            </a:r>
+            <a:endParaRPr lang="fr-FR" sz="1000" dirty="0"/>
+          </a:p>
+          <a:p>
+            <a:r>
+              <a:rPr lang="fr-FR" sz="1000" dirty="0"/>
+              <a:t>Clustering </a:t>
+            </a:r>
+            <a:r>
+              <a:rPr lang="fr-FR" sz="1000" dirty="0" err="1"/>
+              <a:t>method</a:t>
+            </a:r>
+            <a:endParaRPr lang="fr-FR" sz="1000" dirty="0"/>
+          </a:p>
+          <a:p>
+            <a:r>
+              <a:rPr lang="fr-FR" sz="1000" dirty="0" err="1"/>
+              <a:t>Modelisation</a:t>
+            </a:r>
+            <a:r>
+              <a:rPr lang="fr-FR" sz="1000" dirty="0"/>
+              <a:t>/</a:t>
+            </a:r>
+            <a:r>
+              <a:rPr lang="fr-FR" sz="1000" dirty="0" err="1"/>
+              <a:t>prediction</a:t>
+            </a:r>
+            <a:r>
+              <a:rPr lang="fr-FR" sz="1000" dirty="0"/>
+              <a:t> </a:t>
+            </a:r>
+            <a:r>
+              <a:rPr lang="fr-FR" sz="1000" dirty="0" err="1"/>
+              <a:t>method</a:t>
+            </a:r>
+            <a:endParaRPr lang="fr-FR" sz="1000" dirty="0"/>
+          </a:p>
+          <a:p>
+            <a:r>
+              <a:rPr lang="fr-FR" sz="1000" dirty="0" err="1"/>
+              <a:t>Algorithm</a:t>
+            </a:r>
+            <a:r>
+              <a:rPr lang="fr-FR" sz="1000" dirty="0"/>
+              <a:t> vs. </a:t>
+            </a:r>
+            <a:r>
+              <a:rPr lang="fr-FR" sz="1000" i="1" dirty="0"/>
+              <a:t>model</a:t>
+            </a:r>
+          </a:p>
+        </p:txBody>
+      </p:sp>
+      <p:cxnSp>
+        <p:nvCxnSpPr>
+          <p:cNvPr id="60" name="Connecteur droit 59">
+            <a:extLst>
+              <a:ext uri="{FF2B5EF4-FFF2-40B4-BE49-F238E27FC236}">
+                <a16:creationId xmlns:a16="http://schemas.microsoft.com/office/drawing/2014/main" id="{A0E3EB04-42EF-42BF-9217-83A8DDB68998}"/>
+              </a:ext>
+            </a:extLst>
+          </p:cNvPr>
+          <p:cNvCxnSpPr>
+            <a:cxnSpLocks/>
+          </p:cNvCxnSpPr>
+          <p:nvPr/>
+        </p:nvCxnSpPr>
+        <p:spPr>
+          <a:xfrm>
+            <a:off x="10076291" y="6278356"/>
+            <a:ext cx="92278" cy="0"/>
+          </a:xfrm>
+          <a:prstGeom prst="line">
+            <a:avLst/>
+          </a:prstGeom>
+        </p:spPr>
+        <p:style>
+          <a:lnRef idx="3">
+            <a:schemeClr val="accent1"/>
+          </a:lnRef>
+          <a:fillRef idx="0">
+            <a:schemeClr val="accent1"/>
+          </a:fillRef>
+          <a:effectRef idx="2">
+            <a:schemeClr val="accent1"/>
+          </a:effectRef>
+          <a:fontRef idx="minor">
+            <a:schemeClr val="tx1"/>
+          </a:fontRef>
+        </p:style>
+      </p:cxnSp>
+      <p:cxnSp>
+        <p:nvCxnSpPr>
+          <p:cNvPr id="61" name="Connecteur droit 60">
+            <a:extLst>
+              <a:ext uri="{FF2B5EF4-FFF2-40B4-BE49-F238E27FC236}">
+                <a16:creationId xmlns:a16="http://schemas.microsoft.com/office/drawing/2014/main" id="{DA693E67-89D7-4EC0-8C84-13EA40CA961D}"/>
+              </a:ext>
+            </a:extLst>
+          </p:cNvPr>
+          <p:cNvCxnSpPr>
+            <a:cxnSpLocks/>
+          </p:cNvCxnSpPr>
+          <p:nvPr/>
+        </p:nvCxnSpPr>
+        <p:spPr>
+          <a:xfrm>
+            <a:off x="10080485" y="6436900"/>
+            <a:ext cx="92278" cy="0"/>
+          </a:xfrm>
+          <a:prstGeom prst="line">
+            <a:avLst/>
+          </a:prstGeom>
+          <a:ln>
+            <a:solidFill>
+              <a:srgbClr val="7030A0"/>
+            </a:solidFill>
+          </a:ln>
+        </p:spPr>
+        <p:style>
+          <a:lnRef idx="3">
+            <a:schemeClr val="accent1"/>
+          </a:lnRef>
+          <a:fillRef idx="0">
+            <a:schemeClr val="accent1"/>
+          </a:fillRef>
+          <a:effectRef idx="2">
+            <a:schemeClr val="accent1"/>
+          </a:effectRef>
+          <a:fontRef idx="minor">
+            <a:schemeClr val="tx1"/>
+          </a:fontRef>
+        </p:style>
+      </p:cxnSp>
+      <p:cxnSp>
+        <p:nvCxnSpPr>
+          <p:cNvPr id="62" name="Connecteur droit 61">
+            <a:extLst>
+              <a:ext uri="{FF2B5EF4-FFF2-40B4-BE49-F238E27FC236}">
+                <a16:creationId xmlns:a16="http://schemas.microsoft.com/office/drawing/2014/main" id="{53F17603-F975-4D6D-967F-B78DA8E35C49}"/>
+              </a:ext>
+            </a:extLst>
+          </p:cNvPr>
+          <p:cNvCxnSpPr>
+            <a:cxnSpLocks/>
+          </p:cNvCxnSpPr>
+          <p:nvPr/>
+        </p:nvCxnSpPr>
+        <p:spPr>
+          <a:xfrm>
+            <a:off x="10080485" y="6599934"/>
+            <a:ext cx="92278" cy="0"/>
+          </a:xfrm>
+          <a:prstGeom prst="line">
+            <a:avLst/>
+          </a:prstGeom>
+        </p:spPr>
+        <p:style>
+          <a:lnRef idx="3">
+            <a:schemeClr val="accent6"/>
+          </a:lnRef>
+          <a:fillRef idx="0">
+            <a:schemeClr val="accent6"/>
+          </a:fillRef>
+          <a:effectRef idx="2">
+            <a:schemeClr val="accent6"/>
+          </a:effectRef>
+          <a:fontRef idx="minor">
+            <a:schemeClr val="tx1"/>
+          </a:fontRef>
+        </p:style>
+      </p:cxnSp>
     </p:spTree>
     <p:extLst>
       <p:ext uri="{BB962C8B-B14F-4D97-AF65-F5344CB8AC3E}">
@@ -15179,7 +15502,7 @@
           <p:nvPr>
             <p:extLst>
               <p:ext uri="{D42A27DB-BD31-4B8C-83A1-F6EECF244321}">
-                <p14:modId xmlns:p14="http://schemas.microsoft.com/office/powerpoint/2010/main" val="276950443"/>
+                <p14:modId xmlns:p14="http://schemas.microsoft.com/office/powerpoint/2010/main" val="2285969350"/>
               </p:ext>
             </p:extLst>
           </p:nvPr>
@@ -15252,7 +15575,7 @@
         </p:nvSpPr>
         <p:spPr>
           <a:xfrm>
-            <a:off x="10419126" y="2046525"/>
+            <a:off x="10385570" y="2046525"/>
             <a:ext cx="822121" cy="949743"/>
           </a:xfrm>
           <a:prstGeom prst="roundRect">
@@ -15306,7 +15629,7 @@
         </p:nvSpPr>
         <p:spPr>
           <a:xfrm>
-            <a:off x="10633044" y="2098054"/>
+            <a:off x="10591099" y="2098054"/>
             <a:ext cx="394283" cy="861774"/>
           </a:xfrm>
           <a:prstGeom prst="rect">
@@ -15321,31 +15644,51 @@
           <a:lstStyle/>
           <a:p>
             <a:r>
-              <a:rPr lang="en-US" sz="1000" dirty="0"/>
+              <a:rPr lang="en-US" sz="1000" dirty="0">
+                <a:solidFill>
+                  <a:srgbClr val="7030A0"/>
+                </a:solidFill>
+              </a:rPr>
               <a:t>(D)</a:t>
             </a:r>
           </a:p>
           <a:p>
             <a:r>
-              <a:rPr lang="en-US" sz="1000" dirty="0"/>
+              <a:rPr lang="en-US" sz="1000" i="1" dirty="0">
+                <a:solidFill>
+                  <a:srgbClr val="92D050"/>
+                </a:solidFill>
+              </a:rPr>
               <a:t>(E)</a:t>
             </a:r>
           </a:p>
           <a:p>
             <a:r>
-              <a:rPr lang="en-US" sz="1000" dirty="0"/>
+              <a:rPr lang="en-US" sz="1000" i="1" dirty="0">
+                <a:solidFill>
+                  <a:srgbClr val="92D050"/>
+                </a:solidFill>
+              </a:rPr>
               <a:t>(F)</a:t>
             </a:r>
           </a:p>
           <a:p>
             <a:r>
-              <a:rPr lang="en-US" sz="1000" dirty="0"/>
+              <a:rPr lang="en-US" sz="1000" dirty="0">
+                <a:solidFill>
+                  <a:srgbClr val="92D050"/>
+                </a:solidFill>
+              </a:rPr>
               <a:t>(G)</a:t>
             </a:r>
           </a:p>
           <a:p>
             <a:r>
-              <a:rPr lang="en-US" sz="1000" dirty="0"/>
+              <a:rPr lang="en-US" sz="1000" i="1" dirty="0">
+                <a:solidFill>
+                  <a:srgbClr val="7030A0"/>
+                </a:solidFill>
+              </a:rPr>
               <a:t>(H)</a:t>
             </a:r>
           </a:p>
@@ -15365,7 +15708,7 @@
         </p:nvSpPr>
         <p:spPr>
           <a:xfrm>
-            <a:off x="10419126" y="3372725"/>
+            <a:off x="10385570" y="3372725"/>
             <a:ext cx="822121" cy="949743"/>
           </a:xfrm>
           <a:prstGeom prst="roundRect">
@@ -15419,7 +15762,7 @@
         </p:nvSpPr>
         <p:spPr>
           <a:xfrm>
-            <a:off x="10633044" y="3567577"/>
+            <a:off x="10591099" y="3567577"/>
             <a:ext cx="394283" cy="400110"/>
           </a:xfrm>
           <a:prstGeom prst="rect">
@@ -15434,13 +15777,21 @@
           <a:lstStyle/>
           <a:p>
             <a:r>
-              <a:rPr lang="en-US" sz="1000" dirty="0"/>
+              <a:rPr lang="en-US" sz="1000" i="1" dirty="0">
+                <a:solidFill>
+                  <a:srgbClr val="92D050"/>
+                </a:solidFill>
+              </a:rPr>
               <a:t>(I)</a:t>
             </a:r>
           </a:p>
           <a:p>
             <a:r>
-              <a:rPr lang="en-US" sz="1000" dirty="0"/>
+              <a:rPr lang="en-US" sz="1000" dirty="0">
+                <a:solidFill>
+                  <a:srgbClr val="92D050"/>
+                </a:solidFill>
+              </a:rPr>
               <a:t>(J)</a:t>
             </a:r>
           </a:p>
@@ -15460,7 +15811,7 @@
         </p:nvSpPr>
         <p:spPr>
           <a:xfrm>
-            <a:off x="10419126" y="4675076"/>
+            <a:off x="10385570" y="4675076"/>
             <a:ext cx="822121" cy="949743"/>
           </a:xfrm>
           <a:prstGeom prst="roundRect">
@@ -15512,7 +15863,7 @@
         </p:nvSpPr>
         <p:spPr>
           <a:xfrm>
-            <a:off x="10679183" y="4975059"/>
+            <a:off x="10595293" y="4975059"/>
             <a:ext cx="394283" cy="400110"/>
           </a:xfrm>
           <a:prstGeom prst="rect">
@@ -15527,13 +15878,21 @@
           <a:lstStyle/>
           <a:p>
             <a:r>
-              <a:rPr lang="en-US" sz="1000" dirty="0"/>
+              <a:rPr lang="en-US" sz="1000" i="1" dirty="0">
+                <a:solidFill>
+                  <a:srgbClr val="92D050"/>
+                </a:solidFill>
+              </a:rPr>
               <a:t>(K)</a:t>
             </a:r>
           </a:p>
           <a:p>
             <a:r>
-              <a:rPr lang="en-US" sz="1000" dirty="0"/>
+              <a:rPr lang="en-US" sz="1000" i="1" dirty="0">
+                <a:solidFill>
+                  <a:srgbClr val="92D050"/>
+                </a:solidFill>
+              </a:rPr>
               <a:t>(L)</a:t>
             </a:r>
           </a:p>
@@ -15568,24 +15927,251 @@
           <a:lstStyle/>
           <a:p>
             <a:r>
-              <a:rPr lang="en-US" sz="1000" dirty="0"/>
+              <a:rPr lang="en-US" sz="1000" i="1" dirty="0">
+                <a:solidFill>
+                  <a:schemeClr val="accent5">
+                    <a:lumMod val="75000"/>
+                  </a:schemeClr>
+                </a:solidFill>
+              </a:rPr>
               <a:t>(A)</a:t>
             </a:r>
           </a:p>
           <a:p>
             <a:r>
-              <a:rPr lang="en-US" sz="1000" dirty="0"/>
+              <a:rPr lang="en-US" sz="1000" dirty="0">
+                <a:solidFill>
+                  <a:schemeClr val="accent5">
+                    <a:lumMod val="75000"/>
+                  </a:schemeClr>
+                </a:solidFill>
+              </a:rPr>
               <a:t>(B)</a:t>
             </a:r>
           </a:p>
           <a:p>
             <a:r>
-              <a:rPr lang="en-US" sz="1000" dirty="0"/>
+              <a:rPr lang="en-US" sz="1000" dirty="0">
+                <a:solidFill>
+                  <a:srgbClr val="7030A0"/>
+                </a:solidFill>
+              </a:rPr>
               <a:t>(C)</a:t>
             </a:r>
           </a:p>
         </p:txBody>
       </p:sp>
+      <p:sp>
+        <p:nvSpPr>
+          <p:cNvPr id="2" name="ZoneTexte 1">
+            <a:extLst>
+              <a:ext uri="{FF2B5EF4-FFF2-40B4-BE49-F238E27FC236}">
+                <a16:creationId xmlns:a16="http://schemas.microsoft.com/office/drawing/2014/main" id="{F69C242E-51A1-4938-A0FD-B62174145ABD}"/>
+              </a:ext>
+            </a:extLst>
+          </p:cNvPr>
+          <p:cNvSpPr txBox="1"/>
+          <p:nvPr/>
+        </p:nvSpPr>
+        <p:spPr>
+          <a:xfrm>
+            <a:off x="4546832" y="5936998"/>
+            <a:ext cx="1904301" cy="707886"/>
+          </a:xfrm>
+          <a:prstGeom prst="rect">
+            <a:avLst/>
+          </a:prstGeom>
+          <a:noFill/>
+        </p:spPr>
+        <p:txBody>
+          <a:bodyPr wrap="square" rtlCol="0">
+            <a:spAutoFit/>
+          </a:bodyPr>
+          <a:lstStyle/>
+          <a:p>
+            <a:r>
+              <a:rPr lang="fr-FR" sz="1000" dirty="0" err="1"/>
+              <a:t>Comparison</a:t>
+            </a:r>
+            <a:r>
+              <a:rPr lang="fr-FR" sz="1000" dirty="0"/>
+              <a:t> </a:t>
+            </a:r>
+            <a:r>
+              <a:rPr lang="fr-FR" sz="1000" dirty="0" err="1"/>
+              <a:t>method</a:t>
+            </a:r>
+            <a:endParaRPr lang="fr-FR" sz="1000" dirty="0"/>
+          </a:p>
+          <a:p>
+            <a:r>
+              <a:rPr lang="fr-FR" sz="1000" dirty="0"/>
+              <a:t>Clustering </a:t>
+            </a:r>
+            <a:r>
+              <a:rPr lang="fr-FR" sz="1000" dirty="0" err="1"/>
+              <a:t>method</a:t>
+            </a:r>
+            <a:endParaRPr lang="fr-FR" sz="1000" dirty="0"/>
+          </a:p>
+          <a:p>
+            <a:r>
+              <a:rPr lang="fr-FR" sz="1000" dirty="0" err="1"/>
+              <a:t>Modelisation</a:t>
+            </a:r>
+            <a:r>
+              <a:rPr lang="fr-FR" sz="1000" dirty="0"/>
+              <a:t>/</a:t>
+            </a:r>
+            <a:r>
+              <a:rPr lang="fr-FR" sz="1000" dirty="0" err="1"/>
+              <a:t>prediction</a:t>
+            </a:r>
+            <a:r>
+              <a:rPr lang="fr-FR" sz="1000" dirty="0"/>
+              <a:t> </a:t>
+            </a:r>
+            <a:r>
+              <a:rPr lang="fr-FR" sz="1000" dirty="0" err="1"/>
+              <a:t>method</a:t>
+            </a:r>
+            <a:endParaRPr lang="fr-FR" sz="1000" dirty="0"/>
+          </a:p>
+          <a:p>
+            <a:r>
+              <a:rPr lang="fr-FR" sz="1000" dirty="0" err="1"/>
+              <a:t>Algorithm</a:t>
+            </a:r>
+            <a:r>
+              <a:rPr lang="fr-FR" sz="1000" dirty="0"/>
+              <a:t> vs. </a:t>
+            </a:r>
+            <a:r>
+              <a:rPr lang="fr-FR" sz="1000" i="1" dirty="0"/>
+              <a:t>model</a:t>
+            </a:r>
+          </a:p>
+        </p:txBody>
+      </p:sp>
+      <p:cxnSp>
+        <p:nvCxnSpPr>
+          <p:cNvPr id="6" name="Connecteur droit 5">
+            <a:extLst>
+              <a:ext uri="{FF2B5EF4-FFF2-40B4-BE49-F238E27FC236}">
+                <a16:creationId xmlns:a16="http://schemas.microsoft.com/office/drawing/2014/main" id="{77E186C9-CDEA-4D1F-892D-9AAAEC4AE27A}"/>
+              </a:ext>
+            </a:extLst>
+          </p:cNvPr>
+          <p:cNvCxnSpPr>
+            <a:cxnSpLocks/>
+          </p:cNvCxnSpPr>
+          <p:nvPr/>
+        </p:nvCxnSpPr>
+        <p:spPr>
+          <a:xfrm>
+            <a:off x="4454554" y="6065240"/>
+            <a:ext cx="92278" cy="0"/>
+          </a:xfrm>
+          <a:prstGeom prst="line">
+            <a:avLst/>
+          </a:prstGeom>
+        </p:spPr>
+        <p:style>
+          <a:lnRef idx="3">
+            <a:schemeClr val="accent1"/>
+          </a:lnRef>
+          <a:fillRef idx="0">
+            <a:schemeClr val="accent1"/>
+          </a:fillRef>
+          <a:effectRef idx="2">
+            <a:schemeClr val="accent1"/>
+          </a:effectRef>
+          <a:fontRef idx="minor">
+            <a:schemeClr val="tx1"/>
+          </a:fontRef>
+        </p:style>
+      </p:cxnSp>
+      <p:cxnSp>
+        <p:nvCxnSpPr>
+          <p:cNvPr id="16" name="Connecteur droit 15">
+            <a:extLst>
+              <a:ext uri="{FF2B5EF4-FFF2-40B4-BE49-F238E27FC236}">
+                <a16:creationId xmlns:a16="http://schemas.microsoft.com/office/drawing/2014/main" id="{36A0C626-BD17-4B24-8F5A-01EBB6BF9D40}"/>
+              </a:ext>
+            </a:extLst>
+          </p:cNvPr>
+          <p:cNvCxnSpPr>
+            <a:cxnSpLocks/>
+          </p:cNvCxnSpPr>
+          <p:nvPr/>
+        </p:nvCxnSpPr>
+        <p:spPr>
+          <a:xfrm>
+            <a:off x="4458748" y="6223784"/>
+            <a:ext cx="92278" cy="0"/>
+          </a:xfrm>
+          <a:prstGeom prst="line">
+            <a:avLst/>
+          </a:prstGeom>
+          <a:ln>
+            <a:solidFill>
+              <a:srgbClr val="7030A0"/>
+            </a:solidFill>
+          </a:ln>
+        </p:spPr>
+        <p:style>
+          <a:lnRef idx="3">
+            <a:schemeClr val="accent1"/>
+          </a:lnRef>
+          <a:fillRef idx="0">
+            <a:schemeClr val="accent1"/>
+          </a:fillRef>
+          <a:effectRef idx="2">
+            <a:schemeClr val="accent1"/>
+          </a:effectRef>
+          <a:fontRef idx="minor">
+            <a:schemeClr val="tx1"/>
+          </a:fontRef>
+        </p:style>
+      </p:cxnSp>
+      <p:cxnSp>
+        <p:nvCxnSpPr>
+          <p:cNvPr id="17" name="Connecteur droit 16">
+            <a:extLst>
+              <a:ext uri="{FF2B5EF4-FFF2-40B4-BE49-F238E27FC236}">
+                <a16:creationId xmlns:a16="http://schemas.microsoft.com/office/drawing/2014/main" id="{CA4C3061-331C-4794-8200-70B13007904B}"/>
+              </a:ext>
+            </a:extLst>
+          </p:cNvPr>
+          <p:cNvCxnSpPr>
+            <a:cxnSpLocks/>
+          </p:cNvCxnSpPr>
+          <p:nvPr/>
+        </p:nvCxnSpPr>
+        <p:spPr>
+          <a:xfrm>
+            <a:off x="4458748" y="6386818"/>
+            <a:ext cx="92278" cy="0"/>
+          </a:xfrm>
+          <a:prstGeom prst="line">
+            <a:avLst/>
+          </a:prstGeom>
+        </p:spPr>
+        <p:style>
+          <a:lnRef idx="3">
+            <a:schemeClr val="accent6"/>
+          </a:lnRef>
+          <a:fillRef idx="0">
+            <a:schemeClr val="accent6"/>
+          </a:fillRef>
+          <a:effectRef idx="2">
+            <a:schemeClr val="accent6"/>
+          </a:effectRef>
+          <a:fontRef idx="minor">
+            <a:schemeClr val="tx1"/>
+          </a:fontRef>
+        </p:style>
+      </p:cxnSp>
     </p:spTree>
     <p:extLst>
       <p:ext uri="{BB962C8B-B14F-4D97-AF65-F5344CB8AC3E}">

</xml_diff>

<commit_message>
Reduced explanations of examples in the article, transferred to the SM
</commit_message>
<xml_diff>
--- a/Results/schema_060125.pptx
+++ b/Results/schema_060125.pptx
@@ -16217,7 +16217,7 @@
           <p:nvPr>
             <p:extLst>
               <p:ext uri="{D42A27DB-BD31-4B8C-83A1-F6EECF244321}">
-                <p14:modId xmlns:p14="http://schemas.microsoft.com/office/powerpoint/2010/main" val="3802572235"/>
+                <p14:modId xmlns:p14="http://schemas.microsoft.com/office/powerpoint/2010/main" val="1048933717"/>
               </p:ext>
             </p:extLst>
           </p:nvPr>
@@ -16302,10 +16302,9 @@
                     <a:p>
                       <a:pPr algn="ctr"/>
                       <a:r>
-                        <a:rPr lang="fr-FR" b="1" dirty="0" err="1"/>
+                        <a:rPr lang="en-US" b="1" noProof="0" dirty="0"/>
                         <a:t>Quality</a:t>
                       </a:r>
-                      <a:endParaRPr lang="fr-FR" b="1" dirty="0"/>
                     </a:p>
                   </a:txBody>
                   <a:tcPr anchor="ctr"/>
@@ -16317,10 +16316,9 @@
                     <a:p>
                       <a:pPr algn="ctr"/>
                       <a:r>
-                        <a:rPr lang="fr-FR" b="1" dirty="0" err="1"/>
+                        <a:rPr lang="en-US" b="1" noProof="0" dirty="0"/>
                         <a:t>Quantity</a:t>
                       </a:r>
-                      <a:endParaRPr lang="fr-FR" b="1" dirty="0"/>
                     </a:p>
                   </a:txBody>
                   <a:tcPr anchor="ctr"/>
@@ -16364,7 +16362,7 @@
                     <a:p>
                       <a:pPr algn="ctr"/>
                       <a:r>
-                        <a:rPr lang="fr-FR" dirty="0" err="1"/>
+                        <a:rPr lang="en-US" noProof="0" dirty="0"/>
                         <a:t>Medical</a:t>
                       </a:r>
                       <a:r>
@@ -16372,7 +16370,7 @@
                         <a:t> data (</a:t>
                       </a:r>
                       <a:r>
-                        <a:rPr lang="fr-FR" dirty="0" err="1"/>
+                        <a:rPr lang="en-US" noProof="0" dirty="0"/>
                         <a:t>history</a:t>
                       </a:r>
                       <a:r>
@@ -16380,7 +16378,7 @@
                         <a:t> or follow-up </a:t>
                       </a:r>
                       <a:r>
-                        <a:rPr lang="fr-FR" dirty="0" err="1"/>
+                        <a:rPr lang="en-US" noProof="0" dirty="0"/>
                         <a:t>visits</a:t>
                       </a:r>
                       <a:r>
@@ -16430,7 +16428,7 @@
                         <a:t>Ordinal, nominal, </a:t>
                       </a:r>
                       <a:r>
-                        <a:rPr lang="fr-FR" dirty="0" err="1"/>
+                        <a:rPr lang="en-US" noProof="0" dirty="0"/>
                         <a:t>continuous</a:t>
                       </a:r>
                       <a:r>
@@ -16438,10 +16436,9 @@
                         <a:t>, </a:t>
                       </a:r>
                       <a:r>
-                        <a:rPr lang="fr-FR" dirty="0" err="1"/>
+                        <a:rPr lang="en-US" noProof="0" dirty="0"/>
                         <a:t>discrete</a:t>
                       </a:r>
-                      <a:endParaRPr lang="fr-FR" dirty="0"/>
                     </a:p>
                   </a:txBody>
                   <a:tcPr anchor="ctr"/>
@@ -16475,7 +16472,7 @@
                         <a:t>CRF (Case Report </a:t>
                       </a:r>
                       <a:r>
-                        <a:rPr lang="fr-FR" dirty="0" err="1"/>
+                        <a:rPr lang="en-US" noProof="0" dirty="0"/>
                         <a:t>Form</a:t>
                       </a:r>
                       <a:r>
@@ -16497,7 +16494,7 @@
                         <a:t>Medium: </a:t>
                       </a:r>
                       <a:r>
-                        <a:rPr lang="fr-FR" dirty="0" err="1"/>
+                        <a:rPr lang="en-US" noProof="0" dirty="0"/>
                         <a:t>missing</a:t>
                       </a:r>
                       <a:r>
@@ -16505,7 +16502,7 @@
                         <a:t> data, </a:t>
                       </a:r>
                       <a:r>
-                        <a:rPr lang="fr-FR" dirty="0" err="1"/>
+                        <a:rPr lang="en-US" noProof="0" dirty="0"/>
                         <a:t>specific</a:t>
                       </a:r>
                       <a:r>
@@ -16513,10 +16510,9 @@
                         <a:t> questions, </a:t>
                       </a:r>
                       <a:r>
-                        <a:rPr lang="fr-FR" dirty="0" err="1"/>
+                        <a:rPr lang="en-US" noProof="0" dirty="0"/>
                         <a:t>errors</a:t>
                       </a:r>
-                      <a:endParaRPr lang="fr-FR" dirty="0"/>
                     </a:p>
                   </a:txBody>
                   <a:tcPr anchor="ctr"/>
@@ -16532,7 +16528,7 @@
                         <a:t>Medium: </a:t>
                       </a:r>
                       <a:r>
-                        <a:rPr lang="fr-FR" dirty="0" err="1"/>
+                        <a:rPr lang="en-US" noProof="0" dirty="0"/>
                         <a:t>missing</a:t>
                       </a:r>
                       <a:r>
@@ -16554,7 +16550,7 @@
                         <a:t>Ordinal, nominal, </a:t>
                       </a:r>
                       <a:r>
-                        <a:rPr lang="fr-FR" dirty="0" err="1"/>
+                        <a:rPr lang="en-US" noProof="0" dirty="0"/>
                         <a:t>discrete</a:t>
                       </a:r>
                       <a:r>
@@ -16562,10 +16558,9 @@
                         <a:t>, </a:t>
                       </a:r>
                       <a:r>
-                        <a:rPr lang="fr-FR" dirty="0" err="1"/>
+                        <a:rPr lang="en-US" noProof="0" dirty="0"/>
                         <a:t>continuous</a:t>
                       </a:r>
-                      <a:endParaRPr lang="fr-FR" dirty="0"/>
                     </a:p>
                   </a:txBody>
                   <a:tcPr anchor="ctr"/>
@@ -16595,7 +16590,7 @@
                     <a:p>
                       <a:pPr algn="ctr"/>
                       <a:r>
-                        <a:rPr lang="fr-FR" dirty="0" err="1"/>
+                        <a:rPr lang="en-US" noProof="0" dirty="0"/>
                         <a:t>Connected</a:t>
                       </a:r>
                       <a:r>
@@ -16603,10 +16598,9 @@
                         <a:t> </a:t>
                       </a:r>
                       <a:r>
-                        <a:rPr lang="fr-FR" dirty="0" err="1"/>
+                        <a:rPr lang="en-US" noProof="0" dirty="0"/>
                         <a:t>device</a:t>
                       </a:r>
-                      <a:endParaRPr lang="fr-FR" dirty="0"/>
                     </a:p>
                   </a:txBody>
                   <a:tcPr anchor="ctr"/>
@@ -16632,7 +16626,7 @@
                     <a:p>
                       <a:pPr algn="ctr"/>
                       <a:r>
-                        <a:rPr lang="fr-FR" dirty="0" err="1"/>
+                        <a:rPr lang="en-US" noProof="0" dirty="0"/>
                         <a:t>Decreased</a:t>
                       </a:r>
                       <a:r>
@@ -16650,7 +16644,7 @@
                     <a:p>
                       <a:pPr algn="ctr"/>
                       <a:r>
-                        <a:rPr lang="fr-FR" dirty="0" err="1"/>
+                        <a:rPr lang="en-US" noProof="0" dirty="0"/>
                         <a:t>Continuous</a:t>
                       </a:r>
                       <a:r>
@@ -16658,10 +16652,9 @@
                         <a:t>, </a:t>
                       </a:r>
                       <a:r>
-                        <a:rPr lang="fr-FR" dirty="0" err="1"/>
+                        <a:rPr lang="en-US" noProof="0" dirty="0"/>
                         <a:t>discrete</a:t>
                       </a:r>
-                      <a:endParaRPr lang="fr-FR" dirty="0"/>
                     </a:p>
                   </a:txBody>
                   <a:tcPr anchor="ctr"/>
@@ -16709,7 +16702,7 @@
                         <a:t>Good: </a:t>
                       </a:r>
                       <a:r>
-                        <a:rPr lang="fr-FR" dirty="0" err="1"/>
+                        <a:rPr lang="en-US" noProof="0" dirty="0"/>
                         <a:t>specific</a:t>
                       </a:r>
                       <a:r>
@@ -16717,7 +16710,7 @@
                         <a:t> questions but </a:t>
                       </a:r>
                       <a:r>
-                        <a:rPr lang="fr-FR" dirty="0" err="1"/>
+                        <a:rPr lang="en-US" noProof="0" dirty="0"/>
                         <a:t>they</a:t>
                       </a:r>
                       <a:r>
@@ -16725,7 +16718,7 @@
                         <a:t> all have a </a:t>
                       </a:r>
                       <a:r>
-                        <a:rPr lang="fr-FR" dirty="0" err="1"/>
+                        <a:rPr lang="en-US" noProof="0" dirty="0"/>
                         <a:t>mandatory</a:t>
                       </a:r>
                       <a:r>
@@ -16733,7 +16726,7 @@
                         <a:t> </a:t>
                       </a:r>
                       <a:r>
-                        <a:rPr lang="fr-FR" dirty="0" err="1"/>
+                        <a:rPr lang="en-US" noProof="0" dirty="0"/>
                         <a:t>answer</a:t>
                       </a:r>
                       <a:r>
@@ -16785,7 +16778,7 @@
                         <a:t>Ordinal, nominal, </a:t>
                       </a:r>
                       <a:r>
-                        <a:rPr lang="fr-FR" dirty="0" err="1"/>
+                        <a:rPr lang="en-US" noProof="0" dirty="0"/>
                         <a:t>discrete</a:t>
                       </a:r>
                       <a:r>
@@ -16793,10 +16786,9 @@
                         <a:t>, </a:t>
                       </a:r>
                       <a:r>
-                        <a:rPr lang="fr-FR" dirty="0" err="1"/>
+                        <a:rPr lang="en-US" noProof="0" dirty="0"/>
                         <a:t>continuous</a:t>
                       </a:r>
-                      <a:endParaRPr lang="fr-FR" dirty="0"/>
                     </a:p>
                   </a:txBody>
                   <a:tcPr anchor="ctr"/>

</xml_diff>

<commit_message>
First version of article and SM
</commit_message>
<xml_diff>
--- a/Results/schema_060125.pptx
+++ b/Results/schema_060125.pptx
@@ -9791,7 +9791,7 @@
           <a:p>
             <a:fld id="{80FF1440-FB20-43AC-A885-455CF6238228}" type="datetimeFigureOut">
               <a:rPr lang="fr-FR" smtClean="0"/>
-              <a:t>11/02/2025</a:t>
+              <a:t>13/02/2025</a:t>
             </a:fld>
             <a:endParaRPr lang="fr-FR"/>
           </a:p>
@@ -9989,7 +9989,7 @@
           <a:p>
             <a:fld id="{80FF1440-FB20-43AC-A885-455CF6238228}" type="datetimeFigureOut">
               <a:rPr lang="fr-FR" smtClean="0"/>
-              <a:t>11/02/2025</a:t>
+              <a:t>13/02/2025</a:t>
             </a:fld>
             <a:endParaRPr lang="fr-FR"/>
           </a:p>
@@ -10197,7 +10197,7 @@
           <a:p>
             <a:fld id="{80FF1440-FB20-43AC-A885-455CF6238228}" type="datetimeFigureOut">
               <a:rPr lang="fr-FR" smtClean="0"/>
-              <a:t>11/02/2025</a:t>
+              <a:t>13/02/2025</a:t>
             </a:fld>
             <a:endParaRPr lang="fr-FR"/>
           </a:p>
@@ -10395,7 +10395,7 @@
           <a:p>
             <a:fld id="{80FF1440-FB20-43AC-A885-455CF6238228}" type="datetimeFigureOut">
               <a:rPr lang="fr-FR" smtClean="0"/>
-              <a:t>11/02/2025</a:t>
+              <a:t>13/02/2025</a:t>
             </a:fld>
             <a:endParaRPr lang="fr-FR"/>
           </a:p>
@@ -10670,7 +10670,7 @@
           <a:p>
             <a:fld id="{80FF1440-FB20-43AC-A885-455CF6238228}" type="datetimeFigureOut">
               <a:rPr lang="fr-FR" smtClean="0"/>
-              <a:t>11/02/2025</a:t>
+              <a:t>13/02/2025</a:t>
             </a:fld>
             <a:endParaRPr lang="fr-FR"/>
           </a:p>
@@ -10935,7 +10935,7 @@
           <a:p>
             <a:fld id="{80FF1440-FB20-43AC-A885-455CF6238228}" type="datetimeFigureOut">
               <a:rPr lang="fr-FR" smtClean="0"/>
-              <a:t>11/02/2025</a:t>
+              <a:t>13/02/2025</a:t>
             </a:fld>
             <a:endParaRPr lang="fr-FR"/>
           </a:p>
@@ -11347,7 +11347,7 @@
           <a:p>
             <a:fld id="{80FF1440-FB20-43AC-A885-455CF6238228}" type="datetimeFigureOut">
               <a:rPr lang="fr-FR" smtClean="0"/>
-              <a:t>11/02/2025</a:t>
+              <a:t>13/02/2025</a:t>
             </a:fld>
             <a:endParaRPr lang="fr-FR"/>
           </a:p>
@@ -11488,7 +11488,7 @@
           <a:p>
             <a:fld id="{80FF1440-FB20-43AC-A885-455CF6238228}" type="datetimeFigureOut">
               <a:rPr lang="fr-FR" smtClean="0"/>
-              <a:t>11/02/2025</a:t>
+              <a:t>13/02/2025</a:t>
             </a:fld>
             <a:endParaRPr lang="fr-FR"/>
           </a:p>
@@ -11601,7 +11601,7 @@
           <a:p>
             <a:fld id="{80FF1440-FB20-43AC-A885-455CF6238228}" type="datetimeFigureOut">
               <a:rPr lang="fr-FR" smtClean="0"/>
-              <a:t>11/02/2025</a:t>
+              <a:t>13/02/2025</a:t>
             </a:fld>
             <a:endParaRPr lang="fr-FR"/>
           </a:p>
@@ -11912,7 +11912,7 @@
           <a:p>
             <a:fld id="{80FF1440-FB20-43AC-A885-455CF6238228}" type="datetimeFigureOut">
               <a:rPr lang="fr-FR" smtClean="0"/>
-              <a:t>11/02/2025</a:t>
+              <a:t>13/02/2025</a:t>
             </a:fld>
             <a:endParaRPr lang="fr-FR"/>
           </a:p>
@@ -12200,7 +12200,7 @@
           <a:p>
             <a:fld id="{80FF1440-FB20-43AC-A885-455CF6238228}" type="datetimeFigureOut">
               <a:rPr lang="fr-FR" smtClean="0"/>
-              <a:t>11/02/2025</a:t>
+              <a:t>13/02/2025</a:t>
             </a:fld>
             <a:endParaRPr lang="fr-FR"/>
           </a:p>
@@ -12441,7 +12441,7 @@
           <a:p>
             <a:fld id="{80FF1440-FB20-43AC-A885-455CF6238228}" type="datetimeFigureOut">
               <a:rPr lang="fr-FR" smtClean="0"/>
-              <a:t>11/02/2025</a:t>
+              <a:t>13/02/2025</a:t>
             </a:fld>
             <a:endParaRPr lang="fr-FR"/>
           </a:p>
@@ -15924,7 +15924,7 @@
           <p:nvPr>
             <p:extLst>
               <p:ext uri="{D42A27DB-BD31-4B8C-83A1-F6EECF244321}">
-                <p14:modId xmlns:p14="http://schemas.microsoft.com/office/powerpoint/2010/main" val="93994685"/>
+                <p14:modId xmlns:p14="http://schemas.microsoft.com/office/powerpoint/2010/main" val="3351426"/>
               </p:ext>
             </p:extLst>
           </p:nvPr>
@@ -16104,7 +16104,7 @@
                       <a:pPr algn="ctr"/>
                       <a:r>
                         <a:rPr lang="fr-FR" dirty="0"/>
-                        <a:t>Good </a:t>
+                        <a:t>High </a:t>
                       </a:r>
                     </a:p>
                   </a:txBody>
@@ -16118,7 +16118,7 @@
                       <a:pPr algn="ctr"/>
                       <a:r>
                         <a:rPr lang="fr-FR" dirty="0"/>
-                        <a:t>Good</a:t>
+                        <a:t>High</a:t>
                       </a:r>
                     </a:p>
                   </a:txBody>
@@ -16198,7 +16198,7 @@
                       <a:pPr algn="ctr"/>
                       <a:r>
                         <a:rPr lang="fr-FR" dirty="0"/>
-                        <a:t>Medium: </a:t>
+                        <a:t>Moderate: </a:t>
                       </a:r>
                       <a:r>
                         <a:rPr lang="en-US" noProof="0" dirty="0"/>
@@ -16232,7 +16232,7 @@
                       <a:pPr algn="ctr"/>
                       <a:r>
                         <a:rPr lang="fr-FR" dirty="0"/>
-                        <a:t>Medium: </a:t>
+                        <a:t>Moderate: </a:t>
                       </a:r>
                       <a:r>
                         <a:rPr lang="en-US" noProof="0" dirty="0"/>
@@ -16320,7 +16320,7 @@
                       <a:pPr algn="ctr"/>
                       <a:r>
                         <a:rPr lang="fr-FR" dirty="0"/>
-                        <a:t>Good</a:t>
+                        <a:t>High</a:t>
                       </a:r>
                     </a:p>
                   </a:txBody>
@@ -16406,7 +16406,7 @@
                       <a:pPr algn="ctr"/>
                       <a:r>
                         <a:rPr lang="fr-FR" dirty="0"/>
-                        <a:t>Good: </a:t>
+                        <a:t>High: </a:t>
                       </a:r>
                       <a:r>
                         <a:rPr lang="en-US" noProof="0" dirty="0"/>
@@ -16452,7 +16452,7 @@
                       <a:pPr algn="ctr"/>
                       <a:r>
                         <a:rPr lang="fr-FR" dirty="0"/>
-                        <a:t>Medium: time of the interview</a:t>
+                        <a:t>Moderate: time of the interview</a:t>
                       </a:r>
                     </a:p>
                   </a:txBody>

</xml_diff>